<commit_message>
new viz and ppt
</commit_message>
<xml_diff>
--- a/Presentation.pptx
+++ b/Presentation.pptx
@@ -1110,7 +1110,7 @@
   <p:cSld>
     <p:spTree>
       <p:nvGrpSpPr>
-        <p:cNvPr id="97" name="Shape 97"/>
+        <p:cNvPr id="99" name="Shape 99"/>
         <p:cNvGrpSpPr/>
         <p:nvPr/>
       </p:nvGrpSpPr>
@@ -1124,7 +1124,7 @@
       </p:grpSpPr>
       <p:sp>
         <p:nvSpPr>
-          <p:cNvPr id="98" name="Google Shape;98;g7b4e9d3196_0_12:notes"/>
+          <p:cNvPr id="100" name="Google Shape;100;g7b4e9d3196_0_12:notes"/>
           <p:cNvSpPr/>
           <p:nvPr>
             <p:ph idx="2" type="sldImg"/>
@@ -1159,7 +1159,7 @@
       </p:sp>
       <p:sp>
         <p:nvSpPr>
-          <p:cNvPr id="99" name="Google Shape;99;g7b4e9d3196_0_12:notes"/>
+          <p:cNvPr id="101" name="Google Shape;101;g7b4e9d3196_0_12:notes"/>
           <p:cNvSpPr txBox="1"/>
           <p:nvPr>
             <p:ph idx="1" type="body"/>
@@ -1209,7 +1209,7 @@
   <p:cSld>
     <p:spTree>
       <p:nvGrpSpPr>
-        <p:cNvPr id="104" name="Shape 104"/>
+        <p:cNvPr id="106" name="Shape 106"/>
         <p:cNvGrpSpPr/>
         <p:nvPr/>
       </p:nvGrpSpPr>
@@ -1223,7 +1223,7 @@
       </p:grpSpPr>
       <p:sp>
         <p:nvSpPr>
-          <p:cNvPr id="105" name="Google Shape;105;gc6fa3c898_0_22:notes"/>
+          <p:cNvPr id="107" name="Google Shape;107;gc6fa3c898_0_22:notes"/>
           <p:cNvSpPr/>
           <p:nvPr>
             <p:ph idx="2" type="sldImg"/>
@@ -1258,7 +1258,7 @@
       </p:sp>
       <p:sp>
         <p:nvSpPr>
-          <p:cNvPr id="106" name="Google Shape;106;gc6fa3c898_0_22:notes"/>
+          <p:cNvPr id="108" name="Google Shape;108;gc6fa3c898_0_22:notes"/>
           <p:cNvSpPr txBox="1"/>
           <p:nvPr>
             <p:ph idx="1" type="body"/>
@@ -1308,7 +1308,7 @@
   <p:cSld>
     <p:spTree>
       <p:nvGrpSpPr>
-        <p:cNvPr id="110" name="Shape 110"/>
+        <p:cNvPr id="112" name="Shape 112"/>
         <p:cNvGrpSpPr/>
         <p:nvPr/>
       </p:nvGrpSpPr>
@@ -1322,7 +1322,7 @@
       </p:grpSpPr>
       <p:sp>
         <p:nvSpPr>
-          <p:cNvPr id="111" name="Google Shape;111;g7b4e9d3196_0_31:notes"/>
+          <p:cNvPr id="113" name="Google Shape;113;g7b4e9d3196_0_31:notes"/>
           <p:cNvSpPr/>
           <p:nvPr>
             <p:ph idx="2" type="sldImg"/>
@@ -1357,7 +1357,7 @@
       </p:sp>
       <p:sp>
         <p:nvSpPr>
-          <p:cNvPr id="112" name="Google Shape;112;g7b4e9d3196_0_31:notes"/>
+          <p:cNvPr id="114" name="Google Shape;114;g7b4e9d3196_0_31:notes"/>
           <p:cNvSpPr txBox="1"/>
           <p:nvPr>
             <p:ph idx="1" type="body"/>
@@ -1407,7 +1407,7 @@
   <p:cSld>
     <p:spTree>
       <p:nvGrpSpPr>
-        <p:cNvPr id="116" name="Shape 116"/>
+        <p:cNvPr id="118" name="Shape 118"/>
         <p:cNvGrpSpPr/>
         <p:nvPr/>
       </p:nvGrpSpPr>
@@ -1421,7 +1421,7 @@
       </p:grpSpPr>
       <p:sp>
         <p:nvSpPr>
-          <p:cNvPr id="117" name="Google Shape;117;g7b4e9d3196_0_26:notes"/>
+          <p:cNvPr id="119" name="Google Shape;119;g7b4e9d3196_0_26:notes"/>
           <p:cNvSpPr/>
           <p:nvPr>
             <p:ph idx="2" type="sldImg"/>
@@ -1456,7 +1456,7 @@
       </p:sp>
       <p:sp>
         <p:nvSpPr>
-          <p:cNvPr id="118" name="Google Shape;118;g7b4e9d3196_0_26:notes"/>
+          <p:cNvPr id="120" name="Google Shape;120;g7b4e9d3196_0_26:notes"/>
           <p:cNvSpPr txBox="1"/>
           <p:nvPr>
             <p:ph idx="1" type="body"/>
@@ -8594,12 +8594,12 @@
             </a:pPr>
             <a:r>
               <a:rPr lang="en"/>
-              <a:t>Home and Garden categories take longer for potentially fraudulent items to sell</a:t>
+              <a:t>Many of the fraudulent seller names follow a pattern suggesting they may be computer generated</a:t>
             </a:r>
             <a:endParaRPr/>
           </a:p>
           <a:p>
-            <a:pPr indent="0" lvl="0" marL="457200" rtl="0" algn="l">
+            <a:pPr indent="0" lvl="0" marL="0" rtl="0" algn="l">
               <a:spcBef>
                 <a:spcPts val="1600"/>
               </a:spcBef>
@@ -8611,7 +8611,7 @@
             <a:r>
               <a:t/>
             </a:r>
-            <a:endParaRPr/>
+            <a:endParaRPr sz="700"/>
           </a:p>
           <a:p>
             <a:pPr indent="-342900" lvl="0" marL="457200" rtl="0" algn="l">
@@ -8678,8 +8678,64 @@
         </p:blipFill>
         <p:spPr>
           <a:xfrm>
-            <a:off x="35338" y="495775"/>
-            <a:ext cx="4505518" cy="3695099"/>
+            <a:off x="166300" y="0"/>
+            <a:ext cx="4243599" cy="1855475"/>
+          </a:xfrm>
+          <a:prstGeom prst="rect">
+            <a:avLst/>
+          </a:prstGeom>
+          <a:noFill/>
+          <a:ln>
+            <a:noFill/>
+          </a:ln>
+        </p:spPr>
+      </p:pic>
+      <p:pic>
+        <p:nvPicPr>
+          <p:cNvPr id="97" name="Google Shape;97;p16"/>
+          <p:cNvPicPr preferRelativeResize="0"/>
+          <p:nvPr/>
+        </p:nvPicPr>
+        <p:blipFill>
+          <a:blip r:embed="rId4">
+            <a:alphaModFix/>
+          </a:blip>
+          <a:stretch>
+            <a:fillRect/>
+          </a:stretch>
+        </p:blipFill>
+        <p:spPr>
+          <a:xfrm>
+            <a:off x="419750" y="1855475"/>
+            <a:ext cx="3890951" cy="1780050"/>
+          </a:xfrm>
+          <a:prstGeom prst="rect">
+            <a:avLst/>
+          </a:prstGeom>
+          <a:noFill/>
+          <a:ln>
+            <a:noFill/>
+          </a:ln>
+        </p:spPr>
+      </p:pic>
+      <p:pic>
+        <p:nvPicPr>
+          <p:cNvPr id="98" name="Google Shape;98;p16"/>
+          <p:cNvPicPr preferRelativeResize="0"/>
+          <p:nvPr/>
+        </p:nvPicPr>
+        <p:blipFill>
+          <a:blip r:embed="rId5">
+            <a:alphaModFix/>
+          </a:blip>
+          <a:stretch>
+            <a:fillRect/>
+          </a:stretch>
+        </p:blipFill>
+        <p:spPr>
+          <a:xfrm>
+            <a:off x="810550" y="3684675"/>
+            <a:ext cx="3379000" cy="1247700"/>
           </a:xfrm>
           <a:prstGeom prst="rect">
             <a:avLst/>
@@ -8703,7 +8759,7 @@
   <p:cSld>
     <p:spTree>
       <p:nvGrpSpPr>
-        <p:cNvPr id="100" name="Shape 100"/>
+        <p:cNvPr id="102" name="Shape 102"/>
         <p:cNvGrpSpPr/>
         <p:nvPr/>
       </p:nvGrpSpPr>
@@ -8717,7 +8773,7 @@
       </p:grpSpPr>
       <p:sp>
         <p:nvSpPr>
-          <p:cNvPr id="101" name="Google Shape;101;p17"/>
+          <p:cNvPr id="103" name="Google Shape;103;p17"/>
           <p:cNvSpPr txBox="1"/>
           <p:nvPr>
             <p:ph type="title"/>
@@ -8757,7 +8813,7 @@
       </p:sp>
       <p:sp>
         <p:nvSpPr>
-          <p:cNvPr id="102" name="Google Shape;102;p17"/>
+          <p:cNvPr id="104" name="Google Shape;104;p17"/>
           <p:cNvSpPr txBox="1"/>
           <p:nvPr>
             <p:ph idx="2" type="body"/>
@@ -8820,7 +8876,7 @@
             </a:pPr>
             <a:r>
               <a:rPr lang="en"/>
-              <a:t>Many of the fraudulent seller names follow a pattern suggesting they may be computer generated</a:t>
+              <a:t>IBM Watson Tone Analyzer shows that the overall sentiment in reviews is positive</a:t>
             </a:r>
             <a:endParaRPr/>
           </a:p>
@@ -8852,43 +8908,7 @@
             </a:pPr>
             <a:r>
               <a:rPr lang="en"/>
-              <a:t>About </a:t>
-            </a:r>
-            <a:r>
-              <a:rPr lang="en"/>
-              <a:t>1 in 3 scam listings is posted by a seller following this naming pattern</a:t>
-            </a:r>
-            <a:endParaRPr/>
-          </a:p>
-          <a:p>
-            <a:pPr indent="0" lvl="0" marL="457200" rtl="0" algn="l">
-              <a:spcBef>
-                <a:spcPts val="1600"/>
-              </a:spcBef>
-              <a:spcAft>
-                <a:spcPts val="0"/>
-              </a:spcAft>
-              <a:buNone/>
-            </a:pPr>
-            <a:r>
-              <a:t/>
-            </a:r>
-            <a:endParaRPr/>
-          </a:p>
-          <a:p>
-            <a:pPr indent="-342900" lvl="0" marL="457200" rtl="0" algn="l">
-              <a:spcBef>
-                <a:spcPts val="1600"/>
-              </a:spcBef>
-              <a:spcAft>
-                <a:spcPts val="0"/>
-              </a:spcAft>
-              <a:buSzPts val="1800"/>
-              <a:buChar char="●"/>
-            </a:pPr>
-            <a:r>
-              <a:rPr lang="en"/>
-              <a:t>This naming pattern appears less frequently in legitimate listings</a:t>
+              <a:t>We leave out listings with reviews in our possible scam listings because of this positive sentiment</a:t>
             </a:r>
             <a:endParaRPr/>
           </a:p>
@@ -8926,7 +8946,7 @@
       </p:sp>
       <p:pic>
         <p:nvPicPr>
-          <p:cNvPr id="103" name="Google Shape;103;p17"/>
+          <p:cNvPr id="105" name="Google Shape;105;p17"/>
           <p:cNvPicPr preferRelativeResize="0"/>
           <p:nvPr/>
         </p:nvPicPr>
@@ -8940,8 +8960,8 @@
         </p:blipFill>
         <p:spPr>
           <a:xfrm>
-            <a:off x="2100" y="455850"/>
-            <a:ext cx="4571999" cy="4231808"/>
+            <a:off x="119325" y="354363"/>
+            <a:ext cx="4337525" cy="3741975"/>
           </a:xfrm>
           <a:prstGeom prst="rect">
             <a:avLst/>
@@ -8965,7 +8985,7 @@
   <p:cSld>
     <p:spTree>
       <p:nvGrpSpPr>
-        <p:cNvPr id="107" name="Shape 107"/>
+        <p:cNvPr id="109" name="Shape 109"/>
         <p:cNvGrpSpPr/>
         <p:nvPr/>
       </p:nvGrpSpPr>
@@ -8979,7 +8999,7 @@
       </p:grpSpPr>
       <p:sp>
         <p:nvSpPr>
-          <p:cNvPr id="108" name="Google Shape;108;p18"/>
+          <p:cNvPr id="110" name="Google Shape;110;p18"/>
           <p:cNvSpPr txBox="1"/>
           <p:nvPr>
             <p:ph type="title"/>
@@ -9019,7 +9039,7 @@
       </p:sp>
       <p:sp>
         <p:nvSpPr>
-          <p:cNvPr id="109" name="Google Shape;109;p18"/>
+          <p:cNvPr id="111" name="Google Shape;111;p18"/>
           <p:cNvSpPr txBox="1"/>
           <p:nvPr>
             <p:ph idx="1" type="body"/>
@@ -9027,8 +9047,8 @@
         </p:nvSpPr>
         <p:spPr>
           <a:xfrm>
-            <a:off x="2400303" y="1602675"/>
-            <a:ext cx="3071400" cy="3002400"/>
+            <a:off x="2400300" y="1091650"/>
+            <a:ext cx="3071400" cy="3513300"/>
           </a:xfrm>
           <a:prstGeom prst="rect">
             <a:avLst/>
@@ -9152,6 +9172,30 @@
                 </a:solidFill>
               </a:rPr>
               <a:t>SKLearn</a:t>
+            </a:r>
+            <a:endParaRPr b="1" sz="2100">
+              <a:solidFill>
+                <a:schemeClr val="dk1"/>
+              </a:solidFill>
+            </a:endParaRPr>
+          </a:p>
+          <a:p>
+            <a:pPr indent="0" lvl="0" marL="0" rtl="0" algn="l">
+              <a:spcBef>
+                <a:spcPts val="1600"/>
+              </a:spcBef>
+              <a:spcAft>
+                <a:spcPts val="0"/>
+              </a:spcAft>
+              <a:buNone/>
+            </a:pPr>
+            <a:r>
+              <a:rPr b="1" lang="en" sz="2100">
+                <a:solidFill>
+                  <a:schemeClr val="dk1"/>
+                </a:solidFill>
+              </a:rPr>
+              <a:t>IBM Watson API</a:t>
             </a:r>
             <a:endParaRPr b="1" sz="2100">
               <a:solidFill>
@@ -9208,7 +9252,7 @@
   <p:cSld>
     <p:spTree>
       <p:nvGrpSpPr>
-        <p:cNvPr id="113" name="Shape 113"/>
+        <p:cNvPr id="115" name="Shape 115"/>
         <p:cNvGrpSpPr/>
         <p:nvPr/>
       </p:nvGrpSpPr>
@@ -9222,7 +9266,7 @@
       </p:grpSpPr>
       <p:sp>
         <p:nvSpPr>
-          <p:cNvPr id="114" name="Google Shape;114;p19"/>
+          <p:cNvPr id="116" name="Google Shape;116;p19"/>
           <p:cNvSpPr txBox="1"/>
           <p:nvPr>
             <p:ph type="title"/>
@@ -9262,7 +9306,7 @@
       </p:sp>
       <p:sp>
         <p:nvSpPr>
-          <p:cNvPr id="115" name="Google Shape;115;p19"/>
+          <p:cNvPr id="117" name="Google Shape;117;p19"/>
           <p:cNvSpPr txBox="1"/>
           <p:nvPr>
             <p:ph idx="1" type="body"/>
@@ -9491,7 +9535,7 @@
   <p:cSld>
     <p:spTree>
       <p:nvGrpSpPr>
-        <p:cNvPr id="119" name="Shape 119"/>
+        <p:cNvPr id="121" name="Shape 121"/>
         <p:cNvGrpSpPr/>
         <p:nvPr/>
       </p:nvGrpSpPr>
@@ -9505,7 +9549,7 @@
       </p:grpSpPr>
       <p:sp>
         <p:nvSpPr>
-          <p:cNvPr id="120" name="Google Shape;120;p20"/>
+          <p:cNvPr id="122" name="Google Shape;122;p20"/>
           <p:cNvSpPr txBox="1"/>
           <p:nvPr>
             <p:ph type="title"/>
@@ -9545,7 +9589,7 @@
       </p:sp>
       <p:sp>
         <p:nvSpPr>
-          <p:cNvPr id="121" name="Google Shape;121;p20"/>
+          <p:cNvPr id="123" name="Google Shape;123;p20"/>
           <p:cNvSpPr txBox="1"/>
           <p:nvPr>
             <p:ph idx="1" type="body"/>
@@ -9682,6 +9726,285 @@
 </file>
 
 <file path=ppt/theme/theme1.xml><?xml version="1.0" encoding="utf-8"?>
+<a:theme xmlns:a="http://schemas.openxmlformats.org/drawingml/2006/main" xmlns:r="http://schemas.openxmlformats.org/officeDocument/2006/relationships">
+  <a:themeElements>
+    <a:clrScheme name="Default">
+      <a:dk1>
+        <a:srgbClr val="000000"/>
+      </a:dk1>
+      <a:lt1>
+        <a:srgbClr val="FFFFFF"/>
+      </a:lt1>
+      <a:dk2>
+        <a:srgbClr val="158158"/>
+      </a:dk2>
+      <a:lt2>
+        <a:srgbClr val="F3F3F3"/>
+      </a:lt2>
+      <a:accent1>
+        <a:srgbClr val="058DC7"/>
+      </a:accent1>
+      <a:accent2>
+        <a:srgbClr val="50B432"/>
+      </a:accent2>
+      <a:accent3>
+        <a:srgbClr val="ED561B"/>
+      </a:accent3>
+      <a:accent4>
+        <a:srgbClr val="EDEF00"/>
+      </a:accent4>
+      <a:accent5>
+        <a:srgbClr val="24CBE5"/>
+      </a:accent5>
+      <a:accent6>
+        <a:srgbClr val="64E572"/>
+      </a:accent6>
+      <a:hlink>
+        <a:srgbClr val="2200CC"/>
+      </a:hlink>
+      <a:folHlink>
+        <a:srgbClr val="551A8B"/>
+      </a:folHlink>
+    </a:clrScheme>
+    <a:fontScheme name="Office">
+      <a:majorFont>
+        <a:latin typeface="Arial"/>
+        <a:ea typeface=""/>
+        <a:cs typeface=""/>
+        <a:font script="Jpan" typeface="ＭＳ Ｐゴシック"/>
+        <a:font script="Hang" typeface="맑은 고딕"/>
+        <a:font script="Hans" typeface="宋体"/>
+        <a:font script="Hant" typeface="新細明體"/>
+        <a:font script="Arab" typeface="Times New Roman"/>
+        <a:font script="Hebr" typeface="Times New Roman"/>
+        <a:font script="Thai" typeface="Angsana New"/>
+        <a:font script="Ethi" typeface="Nyala"/>
+        <a:font script="Beng" typeface="Vrinda"/>
+        <a:font script="Gujr" typeface="Shruti"/>
+        <a:font script="Khmr" typeface="MoolBoran"/>
+        <a:font script="Knda" typeface="Tunga"/>
+        <a:font script="Guru" typeface="Raavi"/>
+        <a:font script="Cans" typeface="Euphemia"/>
+        <a:font script="Cher" typeface="Plantagenet Cherokee"/>
+        <a:font script="Yiii" typeface="Microsoft Yi Baiti"/>
+        <a:font script="Tibt" typeface="Microsoft Himalaya"/>
+        <a:font script="Thaa" typeface="MV Boli"/>
+        <a:font script="Deva" typeface="Mangal"/>
+        <a:font script="Telu" typeface="Gautami"/>
+        <a:font script="Taml" typeface="Latha"/>
+        <a:font script="Syrc" typeface="Estrangelo Edessa"/>
+        <a:font script="Orya" typeface="Kalinga"/>
+        <a:font script="Mlym" typeface="Kartika"/>
+        <a:font script="Laoo" typeface="DokChampa"/>
+        <a:font script="Sinh" typeface="Iskoola Pota"/>
+        <a:font script="Mong" typeface="Mongolian Baiti"/>
+        <a:font script="Viet" typeface="Times New Roman"/>
+        <a:font script="Uigh" typeface="Microsoft Uighur"/>
+        <a:font script="Geor" typeface="Sylfaen"/>
+      </a:majorFont>
+      <a:minorFont>
+        <a:latin typeface="Arial"/>
+        <a:ea typeface=""/>
+        <a:cs typeface=""/>
+        <a:font script="Jpan" typeface="ＭＳ Ｐゴシック"/>
+        <a:font script="Hang" typeface="맑은 고딕"/>
+        <a:font script="Hans" typeface="宋体"/>
+        <a:font script="Hant" typeface="新細明體"/>
+        <a:font script="Arab" typeface="Arial"/>
+        <a:font script="Hebr" typeface="Arial"/>
+        <a:font script="Thai" typeface="Cordia New"/>
+        <a:font script="Ethi" typeface="Nyala"/>
+        <a:font script="Beng" typeface="Vrinda"/>
+        <a:font script="Gujr" typeface="Shruti"/>
+        <a:font script="Khmr" typeface="DaunPenh"/>
+        <a:font script="Knda" typeface="Tunga"/>
+        <a:font script="Guru" typeface="Raavi"/>
+        <a:font script="Cans" typeface="Euphemia"/>
+        <a:font script="Cher" typeface="Plantagenet Cherokee"/>
+        <a:font script="Yiii" typeface="Microsoft Yi Baiti"/>
+        <a:font script="Tibt" typeface="Microsoft Himalaya"/>
+        <a:font script="Thaa" typeface="MV Boli"/>
+        <a:font script="Deva" typeface="Mangal"/>
+        <a:font script="Telu" typeface="Gautami"/>
+        <a:font script="Taml" typeface="Latha"/>
+        <a:font script="Syrc" typeface="Estrangelo Edessa"/>
+        <a:font script="Orya" typeface="Kalinga"/>
+        <a:font script="Mlym" typeface="Kartika"/>
+        <a:font script="Laoo" typeface="DokChampa"/>
+        <a:font script="Sinh" typeface="Iskoola Pota"/>
+        <a:font script="Mong" typeface="Mongolian Baiti"/>
+        <a:font script="Viet" typeface="Arial"/>
+        <a:font script="Uigh" typeface="Microsoft Uighur"/>
+        <a:font script="Geor" typeface="Sylfaen"/>
+      </a:minorFont>
+    </a:fontScheme>
+    <a:fmtScheme name="Office">
+      <a:fillStyleLst>
+        <a:solidFill>
+          <a:schemeClr val="phClr"/>
+        </a:solidFill>
+        <a:gradFill rotWithShape="1">
+          <a:gsLst>
+            <a:gs pos="0">
+              <a:schemeClr val="phClr">
+                <a:tint val="50000"/>
+                <a:satMod val="300000"/>
+              </a:schemeClr>
+            </a:gs>
+            <a:gs pos="35000">
+              <a:schemeClr val="phClr">
+                <a:tint val="37000"/>
+                <a:satMod val="300000"/>
+              </a:schemeClr>
+            </a:gs>
+            <a:gs pos="100000">
+              <a:schemeClr val="phClr">
+                <a:tint val="15000"/>
+                <a:satMod val="350000"/>
+              </a:schemeClr>
+            </a:gs>
+          </a:gsLst>
+          <a:lin ang="16200000" scaled="1"/>
+        </a:gradFill>
+        <a:gradFill rotWithShape="1">
+          <a:gsLst>
+            <a:gs pos="0">
+              <a:schemeClr val="phClr">
+                <a:tint val="100000"/>
+                <a:shade val="100000"/>
+                <a:satMod val="130000"/>
+              </a:schemeClr>
+            </a:gs>
+            <a:gs pos="100000">
+              <a:schemeClr val="phClr">
+                <a:tint val="50000"/>
+                <a:shade val="100000"/>
+                <a:satMod val="350000"/>
+              </a:schemeClr>
+            </a:gs>
+          </a:gsLst>
+          <a:lin ang="16200000" scaled="0"/>
+        </a:gradFill>
+      </a:fillStyleLst>
+      <a:lnStyleLst>
+        <a:ln w="9525" cap="flat" cmpd="sng" algn="ctr">
+          <a:solidFill>
+            <a:schemeClr val="phClr">
+              <a:shade val="95000"/>
+              <a:satMod val="105000"/>
+            </a:schemeClr>
+          </a:solidFill>
+          <a:prstDash val="solid"/>
+        </a:ln>
+        <a:ln w="25400" cap="flat" cmpd="sng" algn="ctr">
+          <a:solidFill>
+            <a:schemeClr val="phClr"/>
+          </a:solidFill>
+          <a:prstDash val="solid"/>
+        </a:ln>
+        <a:ln w="38100" cap="flat" cmpd="sng" algn="ctr">
+          <a:solidFill>
+            <a:schemeClr val="phClr"/>
+          </a:solidFill>
+          <a:prstDash val="solid"/>
+        </a:ln>
+      </a:lnStyleLst>
+      <a:effectStyleLst>
+        <a:effectStyle>
+          <a:effectLst>
+            <a:outerShdw blurRad="40000" dist="20000" dir="5400000" rotWithShape="0">
+              <a:srgbClr val="000000">
+                <a:alpha val="38000"/>
+              </a:srgbClr>
+            </a:outerShdw>
+          </a:effectLst>
+        </a:effectStyle>
+        <a:effectStyle>
+          <a:effectLst>
+            <a:outerShdw blurRad="40000" dist="23000" dir="5400000" rotWithShape="0">
+              <a:srgbClr val="000000">
+                <a:alpha val="35000"/>
+              </a:srgbClr>
+            </a:outerShdw>
+          </a:effectLst>
+        </a:effectStyle>
+        <a:effectStyle>
+          <a:effectLst>
+            <a:outerShdw blurRad="40000" dist="23000" dir="5400000" rotWithShape="0">
+              <a:srgbClr val="000000">
+                <a:alpha val="35000"/>
+              </a:srgbClr>
+            </a:outerShdw>
+          </a:effectLst>
+          <a:scene3d>
+            <a:camera prst="orthographicFront">
+              <a:rot lat="0" lon="0" rev="0"/>
+            </a:camera>
+            <a:lightRig rig="threePt" dir="t">
+              <a:rot lat="0" lon="0" rev="1200000"/>
+            </a:lightRig>
+          </a:scene3d>
+          <a:sp3d>
+            <a:bevelT w="63500" h="25400"/>
+          </a:sp3d>
+        </a:effectStyle>
+      </a:effectStyleLst>
+      <a:bgFillStyleLst>
+        <a:solidFill>
+          <a:schemeClr val="phClr"/>
+        </a:solidFill>
+        <a:gradFill rotWithShape="1">
+          <a:gsLst>
+            <a:gs pos="0">
+              <a:schemeClr val="phClr">
+                <a:tint val="40000"/>
+                <a:satMod val="350000"/>
+              </a:schemeClr>
+            </a:gs>
+            <a:gs pos="40000">
+              <a:schemeClr val="phClr">
+                <a:tint val="45000"/>
+                <a:shade val="99000"/>
+                <a:satMod val="350000"/>
+              </a:schemeClr>
+            </a:gs>
+            <a:gs pos="100000">
+              <a:schemeClr val="phClr">
+                <a:shade val="20000"/>
+                <a:satMod val="255000"/>
+              </a:schemeClr>
+            </a:gs>
+          </a:gsLst>
+          <a:path path="circle">
+            <a:fillToRect l="50000" t="-80000" r="50000" b="180000"/>
+          </a:path>
+        </a:gradFill>
+        <a:gradFill rotWithShape="1">
+          <a:gsLst>
+            <a:gs pos="0">
+              <a:schemeClr val="phClr">
+                <a:tint val="80000"/>
+                <a:satMod val="300000"/>
+              </a:schemeClr>
+            </a:gs>
+            <a:gs pos="100000">
+              <a:schemeClr val="phClr">
+                <a:shade val="30000"/>
+                <a:satMod val="200000"/>
+              </a:schemeClr>
+            </a:gs>
+          </a:gsLst>
+          <a:path path="circle">
+            <a:fillToRect l="50000" t="50000" r="50000" b="50000"/>
+          </a:path>
+        </a:gradFill>
+      </a:bgFillStyleLst>
+    </a:fmtScheme>
+  </a:themeElements>
+</a:theme>
+</file>
+
+<file path=ppt/theme/theme2.xml><?xml version="1.0" encoding="utf-8"?>
 <a:theme xmlns:a="http://schemas.openxmlformats.org/drawingml/2006/main" xmlns:r="http://schemas.openxmlformats.org/officeDocument/2006/relationships" name="Swiss">
   <a:themeElements>
     <a:clrScheme name="Swiss">
@@ -9958,283 +10281,4 @@
     </a:fmtScheme>
   </a:themeElements>
 </a:theme>
-</file>
-
-<file path=ppt/theme/theme2.xml><?xml version="1.0" encoding="utf-8"?>
-<a:theme xmlns:a="http://schemas.openxmlformats.org/drawingml/2006/main" xmlns:r="http://schemas.openxmlformats.org/officeDocument/2006/relationships">
-  <a:themeElements>
-    <a:clrScheme name="Default">
-      <a:dk1>
-        <a:srgbClr val="000000"/>
-      </a:dk1>
-      <a:lt1>
-        <a:srgbClr val="FFFFFF"/>
-      </a:lt1>
-      <a:dk2>
-        <a:srgbClr val="158158"/>
-      </a:dk2>
-      <a:lt2>
-        <a:srgbClr val="F3F3F3"/>
-      </a:lt2>
-      <a:accent1>
-        <a:srgbClr val="058DC7"/>
-      </a:accent1>
-      <a:accent2>
-        <a:srgbClr val="50B432"/>
-      </a:accent2>
-      <a:accent3>
-        <a:srgbClr val="ED561B"/>
-      </a:accent3>
-      <a:accent4>
-        <a:srgbClr val="EDEF00"/>
-      </a:accent4>
-      <a:accent5>
-        <a:srgbClr val="24CBE5"/>
-      </a:accent5>
-      <a:accent6>
-        <a:srgbClr val="64E572"/>
-      </a:accent6>
-      <a:hlink>
-        <a:srgbClr val="2200CC"/>
-      </a:hlink>
-      <a:folHlink>
-        <a:srgbClr val="551A8B"/>
-      </a:folHlink>
-    </a:clrScheme>
-    <a:fontScheme name="Office">
-      <a:majorFont>
-        <a:latin typeface="Arial"/>
-        <a:ea typeface=""/>
-        <a:cs typeface=""/>
-        <a:font script="Jpan" typeface="ＭＳ Ｐゴシック"/>
-        <a:font script="Hang" typeface="맑은 고딕"/>
-        <a:font script="Hans" typeface="宋体"/>
-        <a:font script="Hant" typeface="新細明體"/>
-        <a:font script="Arab" typeface="Times New Roman"/>
-        <a:font script="Hebr" typeface="Times New Roman"/>
-        <a:font script="Thai" typeface="Angsana New"/>
-        <a:font script="Ethi" typeface="Nyala"/>
-        <a:font script="Beng" typeface="Vrinda"/>
-        <a:font script="Gujr" typeface="Shruti"/>
-        <a:font script="Khmr" typeface="MoolBoran"/>
-        <a:font script="Knda" typeface="Tunga"/>
-        <a:font script="Guru" typeface="Raavi"/>
-        <a:font script="Cans" typeface="Euphemia"/>
-        <a:font script="Cher" typeface="Plantagenet Cherokee"/>
-        <a:font script="Yiii" typeface="Microsoft Yi Baiti"/>
-        <a:font script="Tibt" typeface="Microsoft Himalaya"/>
-        <a:font script="Thaa" typeface="MV Boli"/>
-        <a:font script="Deva" typeface="Mangal"/>
-        <a:font script="Telu" typeface="Gautami"/>
-        <a:font script="Taml" typeface="Latha"/>
-        <a:font script="Syrc" typeface="Estrangelo Edessa"/>
-        <a:font script="Orya" typeface="Kalinga"/>
-        <a:font script="Mlym" typeface="Kartika"/>
-        <a:font script="Laoo" typeface="DokChampa"/>
-        <a:font script="Sinh" typeface="Iskoola Pota"/>
-        <a:font script="Mong" typeface="Mongolian Baiti"/>
-        <a:font script="Viet" typeface="Times New Roman"/>
-        <a:font script="Uigh" typeface="Microsoft Uighur"/>
-        <a:font script="Geor" typeface="Sylfaen"/>
-      </a:majorFont>
-      <a:minorFont>
-        <a:latin typeface="Arial"/>
-        <a:ea typeface=""/>
-        <a:cs typeface=""/>
-        <a:font script="Jpan" typeface="ＭＳ Ｐゴシック"/>
-        <a:font script="Hang" typeface="맑은 고딕"/>
-        <a:font script="Hans" typeface="宋体"/>
-        <a:font script="Hant" typeface="新細明體"/>
-        <a:font script="Arab" typeface="Arial"/>
-        <a:font script="Hebr" typeface="Arial"/>
-        <a:font script="Thai" typeface="Cordia New"/>
-        <a:font script="Ethi" typeface="Nyala"/>
-        <a:font script="Beng" typeface="Vrinda"/>
-        <a:font script="Gujr" typeface="Shruti"/>
-        <a:font script="Khmr" typeface="DaunPenh"/>
-        <a:font script="Knda" typeface="Tunga"/>
-        <a:font script="Guru" typeface="Raavi"/>
-        <a:font script="Cans" typeface="Euphemia"/>
-        <a:font script="Cher" typeface="Plantagenet Cherokee"/>
-        <a:font script="Yiii" typeface="Microsoft Yi Baiti"/>
-        <a:font script="Tibt" typeface="Microsoft Himalaya"/>
-        <a:font script="Thaa" typeface="MV Boli"/>
-        <a:font script="Deva" typeface="Mangal"/>
-        <a:font script="Telu" typeface="Gautami"/>
-        <a:font script="Taml" typeface="Latha"/>
-        <a:font script="Syrc" typeface="Estrangelo Edessa"/>
-        <a:font script="Orya" typeface="Kalinga"/>
-        <a:font script="Mlym" typeface="Kartika"/>
-        <a:font script="Laoo" typeface="DokChampa"/>
-        <a:font script="Sinh" typeface="Iskoola Pota"/>
-        <a:font script="Mong" typeface="Mongolian Baiti"/>
-        <a:font script="Viet" typeface="Arial"/>
-        <a:font script="Uigh" typeface="Microsoft Uighur"/>
-        <a:font script="Geor" typeface="Sylfaen"/>
-      </a:minorFont>
-    </a:fontScheme>
-    <a:fmtScheme name="Office">
-      <a:fillStyleLst>
-        <a:solidFill>
-          <a:schemeClr val="phClr"/>
-        </a:solidFill>
-        <a:gradFill rotWithShape="1">
-          <a:gsLst>
-            <a:gs pos="0">
-              <a:schemeClr val="phClr">
-                <a:tint val="50000"/>
-                <a:satMod val="300000"/>
-              </a:schemeClr>
-            </a:gs>
-            <a:gs pos="35000">
-              <a:schemeClr val="phClr">
-                <a:tint val="37000"/>
-                <a:satMod val="300000"/>
-              </a:schemeClr>
-            </a:gs>
-            <a:gs pos="100000">
-              <a:schemeClr val="phClr">
-                <a:tint val="15000"/>
-                <a:satMod val="350000"/>
-              </a:schemeClr>
-            </a:gs>
-          </a:gsLst>
-          <a:lin ang="16200000" scaled="1"/>
-        </a:gradFill>
-        <a:gradFill rotWithShape="1">
-          <a:gsLst>
-            <a:gs pos="0">
-              <a:schemeClr val="phClr">
-                <a:tint val="100000"/>
-                <a:shade val="100000"/>
-                <a:satMod val="130000"/>
-              </a:schemeClr>
-            </a:gs>
-            <a:gs pos="100000">
-              <a:schemeClr val="phClr">
-                <a:tint val="50000"/>
-                <a:shade val="100000"/>
-                <a:satMod val="350000"/>
-              </a:schemeClr>
-            </a:gs>
-          </a:gsLst>
-          <a:lin ang="16200000" scaled="0"/>
-        </a:gradFill>
-      </a:fillStyleLst>
-      <a:lnStyleLst>
-        <a:ln w="9525" cap="flat" cmpd="sng" algn="ctr">
-          <a:solidFill>
-            <a:schemeClr val="phClr">
-              <a:shade val="95000"/>
-              <a:satMod val="105000"/>
-            </a:schemeClr>
-          </a:solidFill>
-          <a:prstDash val="solid"/>
-        </a:ln>
-        <a:ln w="25400" cap="flat" cmpd="sng" algn="ctr">
-          <a:solidFill>
-            <a:schemeClr val="phClr"/>
-          </a:solidFill>
-          <a:prstDash val="solid"/>
-        </a:ln>
-        <a:ln w="38100" cap="flat" cmpd="sng" algn="ctr">
-          <a:solidFill>
-            <a:schemeClr val="phClr"/>
-          </a:solidFill>
-          <a:prstDash val="solid"/>
-        </a:ln>
-      </a:lnStyleLst>
-      <a:effectStyleLst>
-        <a:effectStyle>
-          <a:effectLst>
-            <a:outerShdw blurRad="40000" dist="20000" dir="5400000" rotWithShape="0">
-              <a:srgbClr val="000000">
-                <a:alpha val="38000"/>
-              </a:srgbClr>
-            </a:outerShdw>
-          </a:effectLst>
-        </a:effectStyle>
-        <a:effectStyle>
-          <a:effectLst>
-            <a:outerShdw blurRad="40000" dist="23000" dir="5400000" rotWithShape="0">
-              <a:srgbClr val="000000">
-                <a:alpha val="35000"/>
-              </a:srgbClr>
-            </a:outerShdw>
-          </a:effectLst>
-        </a:effectStyle>
-        <a:effectStyle>
-          <a:effectLst>
-            <a:outerShdw blurRad="40000" dist="23000" dir="5400000" rotWithShape="0">
-              <a:srgbClr val="000000">
-                <a:alpha val="35000"/>
-              </a:srgbClr>
-            </a:outerShdw>
-          </a:effectLst>
-          <a:scene3d>
-            <a:camera prst="orthographicFront">
-              <a:rot lat="0" lon="0" rev="0"/>
-            </a:camera>
-            <a:lightRig rig="threePt" dir="t">
-              <a:rot lat="0" lon="0" rev="1200000"/>
-            </a:lightRig>
-          </a:scene3d>
-          <a:sp3d>
-            <a:bevelT w="63500" h="25400"/>
-          </a:sp3d>
-        </a:effectStyle>
-      </a:effectStyleLst>
-      <a:bgFillStyleLst>
-        <a:solidFill>
-          <a:schemeClr val="phClr"/>
-        </a:solidFill>
-        <a:gradFill rotWithShape="1">
-          <a:gsLst>
-            <a:gs pos="0">
-              <a:schemeClr val="phClr">
-                <a:tint val="40000"/>
-                <a:satMod val="350000"/>
-              </a:schemeClr>
-            </a:gs>
-            <a:gs pos="40000">
-              <a:schemeClr val="phClr">
-                <a:tint val="45000"/>
-                <a:shade val="99000"/>
-                <a:satMod val="350000"/>
-              </a:schemeClr>
-            </a:gs>
-            <a:gs pos="100000">
-              <a:schemeClr val="phClr">
-                <a:shade val="20000"/>
-                <a:satMod val="255000"/>
-              </a:schemeClr>
-            </a:gs>
-          </a:gsLst>
-          <a:path path="circle">
-            <a:fillToRect l="50000" t="-80000" r="50000" b="180000"/>
-          </a:path>
-        </a:gradFill>
-        <a:gradFill rotWithShape="1">
-          <a:gsLst>
-            <a:gs pos="0">
-              <a:schemeClr val="phClr">
-                <a:tint val="80000"/>
-                <a:satMod val="300000"/>
-              </a:schemeClr>
-            </a:gs>
-            <a:gs pos="100000">
-              <a:schemeClr val="phClr">
-                <a:shade val="30000"/>
-                <a:satMod val="200000"/>
-              </a:schemeClr>
-            </a:gs>
-          </a:gsLst>
-          <a:path path="circle">
-            <a:fillToRect l="50000" t="50000" r="50000" b="50000"/>
-          </a:path>
-        </a:gradFill>
-      </a:bgFillStyleLst>
-    </a:fmtScheme>
-  </a:themeElements>
-</a:theme>
 </file>
</xml_diff>